<commit_message>
edit feature and steps defined for each scenario to a feature, design explorer method created. wait reduce to 2sec
</commit_message>
<xml_diff>
--- a/Documents/Automation Setup.pptx
+++ b/Documents/Automation Setup.pptx
@@ -20651,31 +20651,6 @@
           </a:p>
         </p:txBody>
       </p:sp>
-      <p:sp>
-        <p:nvSpPr>
-          <p:cNvPr id="3" name="Subtitle 2">
-            <a:extLst>
-              <a:ext uri="{FF2B5EF4-FFF2-40B4-BE49-F238E27FC236}">
-                <a16:creationId xmlns:a16="http://schemas.microsoft.com/office/drawing/2014/main" id="{E1E0B348-50E5-411B-9655-92A290EB1C64}"/>
-              </a:ext>
-            </a:extLst>
-          </p:cNvPr>
-          <p:cNvSpPr>
-            <a:spLocks noGrp="1"/>
-          </p:cNvSpPr>
-          <p:nvPr>
-            <p:ph type="subTitle" idx="1"/>
-          </p:nvPr>
-        </p:nvSpPr>
-        <p:spPr/>
-        <p:txBody>
-          <a:bodyPr/>
-          <a:lstStyle/>
-          <a:p>
-            <a:endParaRPr lang="en-GB"/>
-          </a:p>
-        </p:txBody>
-      </p:sp>
     </p:spTree>
     <p:extLst>
       <p:ext uri="{BB962C8B-B14F-4D97-AF65-F5344CB8AC3E}">
@@ -23034,7 +23009,7 @@
         </p:blipFill>
         <p:spPr>
           <a:xfrm>
-            <a:off x="5203767" y="1526861"/>
+            <a:off x="5157112" y="1526861"/>
             <a:ext cx="6542117" cy="3647229"/>
           </a:xfrm>
           <a:prstGeom prst="rect">

</xml_diff>